<commit_message>
Charging recomandations page done
</commit_message>
<xml_diff>
--- a/target/ppt/input.pptx
+++ b/target/ppt/input.pptx
@@ -282,7 +282,7 @@
           <a:p>
             <a:fld id="{3A1A0583-4DD2-4447-BB98-703DF4A55311}" type="datetimeFigureOut">
               <a:rPr lang="en-US" smtClean="0"/>
-              <a:t>07-Dec-18</a:t>
+              <a:t>09-Dec-18</a:t>
             </a:fld>
             <a:endParaRPr lang="en-US"/>
           </a:p>
@@ -452,7 +452,7 @@
           <a:p>
             <a:fld id="{3A1A0583-4DD2-4447-BB98-703DF4A55311}" type="datetimeFigureOut">
               <a:rPr lang="en-US" smtClean="0"/>
-              <a:t>07-Dec-18</a:t>
+              <a:t>09-Dec-18</a:t>
             </a:fld>
             <a:endParaRPr lang="en-US"/>
           </a:p>
@@ -632,7 +632,7 @@
           <a:p>
             <a:fld id="{3A1A0583-4DD2-4447-BB98-703DF4A55311}" type="datetimeFigureOut">
               <a:rPr lang="en-US" smtClean="0"/>
-              <a:t>07-Dec-18</a:t>
+              <a:t>09-Dec-18</a:t>
             </a:fld>
             <a:endParaRPr lang="en-US"/>
           </a:p>
@@ -802,7 +802,7 @@
           <a:p>
             <a:fld id="{3A1A0583-4DD2-4447-BB98-703DF4A55311}" type="datetimeFigureOut">
               <a:rPr lang="en-US" smtClean="0"/>
-              <a:t>07-Dec-18</a:t>
+              <a:t>09-Dec-18</a:t>
             </a:fld>
             <a:endParaRPr lang="en-US"/>
           </a:p>
@@ -1046,7 +1046,7 @@
           <a:p>
             <a:fld id="{3A1A0583-4DD2-4447-BB98-703DF4A55311}" type="datetimeFigureOut">
               <a:rPr lang="en-US" smtClean="0"/>
-              <a:t>07-Dec-18</a:t>
+              <a:t>09-Dec-18</a:t>
             </a:fld>
             <a:endParaRPr lang="en-US"/>
           </a:p>
@@ -1278,7 +1278,7 @@
           <a:p>
             <a:fld id="{3A1A0583-4DD2-4447-BB98-703DF4A55311}" type="datetimeFigureOut">
               <a:rPr lang="en-US" smtClean="0"/>
-              <a:t>07-Dec-18</a:t>
+              <a:t>09-Dec-18</a:t>
             </a:fld>
             <a:endParaRPr lang="en-US"/>
           </a:p>
@@ -1645,7 +1645,7 @@
           <a:p>
             <a:fld id="{3A1A0583-4DD2-4447-BB98-703DF4A55311}" type="datetimeFigureOut">
               <a:rPr lang="en-US" smtClean="0"/>
-              <a:t>07-Dec-18</a:t>
+              <a:t>09-Dec-18</a:t>
             </a:fld>
             <a:endParaRPr lang="en-US"/>
           </a:p>
@@ -1763,7 +1763,7 @@
           <a:p>
             <a:fld id="{3A1A0583-4DD2-4447-BB98-703DF4A55311}" type="datetimeFigureOut">
               <a:rPr lang="en-US" smtClean="0"/>
-              <a:t>07-Dec-18</a:t>
+              <a:t>09-Dec-18</a:t>
             </a:fld>
             <a:endParaRPr lang="en-US"/>
           </a:p>
@@ -1858,7 +1858,7 @@
           <a:p>
             <a:fld id="{3A1A0583-4DD2-4447-BB98-703DF4A55311}" type="datetimeFigureOut">
               <a:rPr lang="en-US" smtClean="0"/>
-              <a:t>07-Dec-18</a:t>
+              <a:t>09-Dec-18</a:t>
             </a:fld>
             <a:endParaRPr lang="en-US"/>
           </a:p>
@@ -2135,7 +2135,7 @@
           <a:p>
             <a:fld id="{3A1A0583-4DD2-4447-BB98-703DF4A55311}" type="datetimeFigureOut">
               <a:rPr lang="en-US" smtClean="0"/>
-              <a:t>07-Dec-18</a:t>
+              <a:t>09-Dec-18</a:t>
             </a:fld>
             <a:endParaRPr lang="en-US"/>
           </a:p>
@@ -2392,7 +2392,7 @@
           <a:p>
             <a:fld id="{3A1A0583-4DD2-4447-BB98-703DF4A55311}" type="datetimeFigureOut">
               <a:rPr lang="en-US" smtClean="0"/>
-              <a:t>07-Dec-18</a:t>
+              <a:t>09-Dec-18</a:t>
             </a:fld>
             <a:endParaRPr lang="en-US"/>
           </a:p>
@@ -2605,7 +2605,7 @@
           <a:p>
             <a:fld id="{3A1A0583-4DD2-4447-BB98-703DF4A55311}" type="datetimeFigureOut">
               <a:rPr lang="en-US" smtClean="0"/>
-              <a:t>07-Dec-18</a:t>
+              <a:t>09-Dec-18</a:t>
             </a:fld>
             <a:endParaRPr lang="en-US"/>
           </a:p>
@@ -3015,7 +3015,7 @@
           <p:cNvPr id="2" name="Title 1">
             <a:extLst>
               <a:ext uri="{FF2B5EF4-FFF2-40B4-BE49-F238E27FC236}">
-                <a16:creationId xmlns:a16="http://schemas.microsoft.com/office/drawing/2014/main" xmlns="" id="{40A9CD24-37FA-4CA0-AB35-33C7DC683001}"/>
+                <a16:creationId xmlns="" xmlns:a16="http://schemas.microsoft.com/office/drawing/2014/main" id="{40A9CD24-37FA-4CA0-AB35-33C7DC683001}"/>
               </a:ext>
             </a:extLst>
           </p:cNvPr>
@@ -3162,7 +3162,7 @@
           <p:cNvPr id="5" name="Subtitle 2">
             <a:extLst>
               <a:ext uri="{FF2B5EF4-FFF2-40B4-BE49-F238E27FC236}">
-                <a16:creationId xmlns:a16="http://schemas.microsoft.com/office/drawing/2014/main" xmlns="" id="{911ECA13-4934-46C4-90F3-A2C32BB431F1}"/>
+                <a16:creationId xmlns="" xmlns:a16="http://schemas.microsoft.com/office/drawing/2014/main" id="{911ECA13-4934-46C4-90F3-A2C32BB431F1}"/>
               </a:ext>
             </a:extLst>
           </p:cNvPr>
@@ -3418,7 +3418,7 @@
           <p:cNvPr id="4" name="Subtitle 2">
             <a:extLst>
               <a:ext uri="{FF2B5EF4-FFF2-40B4-BE49-F238E27FC236}">
-                <a16:creationId xmlns:a16="http://schemas.microsoft.com/office/drawing/2014/main" xmlns="" id="{1933E0AA-6541-41A3-AD9C-A84EEC350A86}"/>
+                <a16:creationId xmlns="" xmlns:a16="http://schemas.microsoft.com/office/drawing/2014/main" id="{1933E0AA-6541-41A3-AD9C-A84EEC350A86}"/>
               </a:ext>
             </a:extLst>
           </p:cNvPr>
@@ -3766,7 +3766,7 @@
           <p:cNvPr id="7" name="Content Placeholder 4">
             <a:extLst>
               <a:ext uri="{FF2B5EF4-FFF2-40B4-BE49-F238E27FC236}">
-                <a16:creationId xmlns:a16="http://schemas.microsoft.com/office/drawing/2014/main" xmlns="" id="{A1620F20-31B9-4A20-A069-F6E2FECCE0CC}"/>
+                <a16:creationId xmlns="" xmlns:a16="http://schemas.microsoft.com/office/drawing/2014/main" id="{A1620F20-31B9-4A20-A069-F6E2FECCE0CC}"/>
               </a:ext>
             </a:extLst>
           </p:cNvPr>
@@ -3802,7 +3802,7 @@
           <p:cNvPr id="3" name="Rectangle: Rounded Corners 2">
             <a:extLst>
               <a:ext uri="{FF2B5EF4-FFF2-40B4-BE49-F238E27FC236}">
-                <a16:creationId xmlns:a16="http://schemas.microsoft.com/office/drawing/2014/main" xmlns="" id="{EAD6FD5C-4380-483D-9E94-9EB02C8A0FD9}"/>
+                <a16:creationId xmlns="" xmlns:a16="http://schemas.microsoft.com/office/drawing/2014/main" id="{EAD6FD5C-4380-483D-9E94-9EB02C8A0FD9}"/>
               </a:ext>
             </a:extLst>
           </p:cNvPr>
@@ -3854,7 +3854,7 @@
           <p:cNvPr id="8" name="Rectangle 7">
             <a:extLst>
               <a:ext uri="{FF2B5EF4-FFF2-40B4-BE49-F238E27FC236}">
-                <a16:creationId xmlns:a16="http://schemas.microsoft.com/office/drawing/2014/main" xmlns="" id="{484529E5-7CC8-451F-B95E-ED27BEDC4E38}"/>
+                <a16:creationId xmlns="" xmlns:a16="http://schemas.microsoft.com/office/drawing/2014/main" id="{484529E5-7CC8-451F-B95E-ED27BEDC4E38}"/>
               </a:ext>
             </a:extLst>
           </p:cNvPr>
@@ -4213,7 +4213,7 @@
           <p:cNvPr id="2" name="Title 1">
             <a:extLst>
               <a:ext uri="{FF2B5EF4-FFF2-40B4-BE49-F238E27FC236}">
-                <a16:creationId xmlns:a16="http://schemas.microsoft.com/office/drawing/2014/main" xmlns="" id="{E233D4FD-6EAD-4986-AE47-8B2A483D9809}"/>
+                <a16:creationId xmlns="" xmlns:a16="http://schemas.microsoft.com/office/drawing/2014/main" id="{E233D4FD-6EAD-4986-AE47-8B2A483D9809}"/>
               </a:ext>
             </a:extLst>
           </p:cNvPr>
@@ -4353,7 +4353,7 @@
           <p:cNvPr id="3" name="Content Placeholder 2">
             <a:extLst>
               <a:ext uri="{FF2B5EF4-FFF2-40B4-BE49-F238E27FC236}">
-                <a16:creationId xmlns:a16="http://schemas.microsoft.com/office/drawing/2014/main" xmlns="" id="{6B11DE6E-B325-4E89-BF0B-5CFEEF05CF97}"/>
+                <a16:creationId xmlns="" xmlns:a16="http://schemas.microsoft.com/office/drawing/2014/main" id="{6B11DE6E-B325-4E89-BF0B-5CFEEF05CF97}"/>
               </a:ext>
             </a:extLst>
           </p:cNvPr>
@@ -5722,7 +5722,7 @@
           <p:cNvPr id="5" name="Content Placeholder 4">
             <a:extLst>
               <a:ext uri="{FF2B5EF4-FFF2-40B4-BE49-F238E27FC236}">
-                <a16:creationId xmlns:a16="http://schemas.microsoft.com/office/drawing/2014/main" xmlns="" id="{40D2702A-9FD9-4624-ACEA-48F984224138}"/>
+                <a16:creationId xmlns="" xmlns:a16="http://schemas.microsoft.com/office/drawing/2014/main" id="{40D2702A-9FD9-4624-ACEA-48F984224138}"/>
               </a:ext>
             </a:extLst>
           </p:cNvPr>
@@ -5788,7 +5788,7 @@
           <p:cNvPr id="3" name="Content Placeholder 2">
             <a:extLst>
               <a:ext uri="{FF2B5EF4-FFF2-40B4-BE49-F238E27FC236}">
-                <a16:creationId xmlns:a16="http://schemas.microsoft.com/office/drawing/2014/main" xmlns="" id="{8839CF6F-7F7B-40D6-9674-A4D9AC92876A}"/>
+                <a16:creationId xmlns="" xmlns:a16="http://schemas.microsoft.com/office/drawing/2014/main" id="{8839CF6F-7F7B-40D6-9674-A4D9AC92876A}"/>
               </a:ext>
             </a:extLst>
           </p:cNvPr>
@@ -5807,7 +5807,7 @@
         </p:spPr>
         <p:txBody>
           <a:bodyPr>
-            <a:normAutofit/>
+            <a:normAutofit lnSpcReduction="10000"/>
           </a:bodyPr>
           <a:lstStyle/>
           <a:p>
@@ -6390,12 +6390,92 @@
               <a:buNone/>
             </a:pPr>
             <a:r>
+              <a:rPr lang="en-US" sz="2000" smtClean="0">
+                <a:latin typeface="Open Sans" panose="020B0606030504020204" pitchFamily="34" charset="0"/>
+                <a:ea typeface="Open Sans" panose="020B0606030504020204" pitchFamily="34" charset="0"/>
+                <a:cs typeface="Open Sans" panose="020B0606030504020204" pitchFamily="34" charset="0"/>
+              </a:rPr>
+              <a:t>Placeholder_masina </a:t>
+            </a:r>
+            <a:r>
+              <a:rPr lang="ro-RO" sz="2000" smtClean="0">
+                <a:latin typeface="Open Sans" panose="020B0606030504020204" pitchFamily="34" charset="0"/>
+                <a:ea typeface="Open Sans" panose="020B0606030504020204" pitchFamily="34" charset="0"/>
+                <a:cs typeface="Open Sans" panose="020B0606030504020204" pitchFamily="34" charset="0"/>
+              </a:rPr>
+              <a:t>î</a:t>
+            </a:r>
+            <a:r>
+              <a:rPr lang="en-US" sz="2000" dirty="0" err="1">
+                <a:latin typeface="Open Sans" panose="020B0606030504020204" pitchFamily="34" charset="0"/>
+                <a:ea typeface="Open Sans" panose="020B0606030504020204" pitchFamily="34" charset="0"/>
+                <a:cs typeface="Open Sans" panose="020B0606030504020204" pitchFamily="34" charset="0"/>
+              </a:rPr>
+              <a:t>ncarc</a:t>
+            </a:r>
+            <a:r>
+              <a:rPr lang="ro-RO" sz="2000" dirty="0">
+                <a:latin typeface="Open Sans" panose="020B0606030504020204" pitchFamily="34" charset="0"/>
+                <a:ea typeface="Open Sans" panose="020B0606030504020204" pitchFamily="34" charset="0"/>
+                <a:cs typeface="Open Sans" panose="020B0606030504020204" pitchFamily="34" charset="0"/>
+              </a:rPr>
+              <a:t>ă</a:t>
+            </a:r>
+            <a:r>
               <a:rPr lang="en-US" sz="2000" dirty="0">
                 <a:latin typeface="Open Sans" panose="020B0606030504020204" pitchFamily="34" charset="0"/>
                 <a:ea typeface="Open Sans" panose="020B0606030504020204" pitchFamily="34" charset="0"/>
                 <a:cs typeface="Open Sans" panose="020B0606030504020204" pitchFamily="34" charset="0"/>
               </a:rPr>
-              <a:t>Nissan Leaf </a:t>
+              <a:t> cu </a:t>
+            </a:r>
+            <a:r>
+              <a:rPr lang="en-US" sz="2000">
+                <a:latin typeface="Open Sans" panose="020B0606030504020204" pitchFamily="34" charset="0"/>
+                <a:ea typeface="Open Sans" panose="020B0606030504020204" pitchFamily="34" charset="0"/>
+                <a:cs typeface="Open Sans" panose="020B0606030504020204" pitchFamily="34" charset="0"/>
+              </a:rPr>
+              <a:t>maxim </a:t>
+            </a:r>
+            <a:r>
+              <a:rPr lang="en-US" sz="2000" smtClean="0">
+                <a:latin typeface="Open Sans" panose="020B0606030504020204" pitchFamily="34" charset="0"/>
+                <a:ea typeface="Open Sans" panose="020B0606030504020204" pitchFamily="34" charset="0"/>
+                <a:cs typeface="Open Sans" panose="020B0606030504020204" pitchFamily="34" charset="0"/>
+              </a:rPr>
+              <a:t>placeholder_putere </a:t>
+            </a:r>
+            <a:r>
+              <a:rPr lang="en-US" sz="2000" dirty="0">
+                <a:latin typeface="Open Sans" panose="020B0606030504020204" pitchFamily="34" charset="0"/>
+                <a:ea typeface="Open Sans" panose="020B0606030504020204" pitchFamily="34" charset="0"/>
+                <a:cs typeface="Open Sans" panose="020B0606030504020204" pitchFamily="34" charset="0"/>
+              </a:rPr>
+              <a:t>kW, </a:t>
+            </a:r>
+            <a:r>
+              <a:rPr lang="en-US" sz="2000" dirty="0" err="1">
+                <a:latin typeface="Open Sans" panose="020B0606030504020204" pitchFamily="34" charset="0"/>
+                <a:ea typeface="Open Sans" panose="020B0606030504020204" pitchFamily="34" charset="0"/>
+                <a:cs typeface="Open Sans" panose="020B0606030504020204" pitchFamily="34" charset="0"/>
+              </a:rPr>
+              <a:t>indiferent</a:t>
+            </a:r>
+            <a:r>
+              <a:rPr lang="en-US" sz="2000" dirty="0">
+                <a:latin typeface="Open Sans" panose="020B0606030504020204" pitchFamily="34" charset="0"/>
+                <a:ea typeface="Open Sans" panose="020B0606030504020204" pitchFamily="34" charset="0"/>
+                <a:cs typeface="Open Sans" panose="020B0606030504020204" pitchFamily="34" charset="0"/>
+              </a:rPr>
+              <a:t> </a:t>
+            </a:r>
+            <a:r>
+              <a:rPr lang="en-US" sz="2000" dirty="0" err="1">
+                <a:latin typeface="Open Sans" panose="020B0606030504020204" pitchFamily="34" charset="0"/>
+                <a:ea typeface="Open Sans" panose="020B0606030504020204" pitchFamily="34" charset="0"/>
+                <a:cs typeface="Open Sans" panose="020B0606030504020204" pitchFamily="34" charset="0"/>
+              </a:rPr>
+              <a:t>dac</a:t>
             </a:r>
             <a:r>
               <a:rPr lang="ro-RO" sz="2000" dirty="0">
@@ -6403,7 +6483,15 @@
                 <a:ea typeface="Open Sans" panose="020B0606030504020204" pitchFamily="34" charset="0"/>
                 <a:cs typeface="Open Sans" panose="020B0606030504020204" pitchFamily="34" charset="0"/>
               </a:rPr>
-              <a:t>î</a:t>
+              <a:t>ă</a:t>
+            </a:r>
+            <a:r>
+              <a:rPr lang="en-US" sz="2000" dirty="0">
+                <a:latin typeface="Open Sans" panose="020B0606030504020204" pitchFamily="34" charset="0"/>
+                <a:ea typeface="Open Sans" panose="020B0606030504020204" pitchFamily="34" charset="0"/>
+                <a:cs typeface="Open Sans" panose="020B0606030504020204" pitchFamily="34" charset="0"/>
+              </a:rPr>
+              <a:t> </a:t>
             </a:r>
             <a:r>
               <a:rPr lang="en-US" sz="2000" dirty="0" err="1">
@@ -6411,7 +6499,23 @@
                 <a:ea typeface="Open Sans" panose="020B0606030504020204" pitchFamily="34" charset="0"/>
                 <a:cs typeface="Open Sans" panose="020B0606030504020204" pitchFamily="34" charset="0"/>
               </a:rPr>
-              <a:t>ncarc</a:t>
+              <a:t>acesta</a:t>
+            </a:r>
+            <a:r>
+              <a:rPr lang="en-US" sz="2000" dirty="0">
+                <a:latin typeface="Open Sans" panose="020B0606030504020204" pitchFamily="34" charset="0"/>
+                <a:ea typeface="Open Sans" panose="020B0606030504020204" pitchFamily="34" charset="0"/>
+                <a:cs typeface="Open Sans" panose="020B0606030504020204" pitchFamily="34" charset="0"/>
+              </a:rPr>
+              <a:t> </a:t>
+            </a:r>
+            <a:r>
+              <a:rPr lang="en-US" sz="2000" dirty="0" err="1">
+                <a:latin typeface="Open Sans" panose="020B0606030504020204" pitchFamily="34" charset="0"/>
+                <a:ea typeface="Open Sans" panose="020B0606030504020204" pitchFamily="34" charset="0"/>
+                <a:cs typeface="Open Sans" panose="020B0606030504020204" pitchFamily="34" charset="0"/>
+              </a:rPr>
+              <a:t>este</a:t>
             </a:r>
             <a:r>
               <a:rPr lang="ro-RO" sz="2000" dirty="0">
@@ -6419,39 +6523,31 @@
                 <a:ea typeface="Open Sans" panose="020B0606030504020204" pitchFamily="34" charset="0"/>
                 <a:cs typeface="Open Sans" panose="020B0606030504020204" pitchFamily="34" charset="0"/>
               </a:rPr>
-              <a:t>ă</a:t>
-            </a:r>
-            <a:r>
-              <a:rPr lang="en-US" sz="2000" dirty="0">
-                <a:latin typeface="Open Sans" panose="020B0606030504020204" pitchFamily="34" charset="0"/>
-                <a:ea typeface="Open Sans" panose="020B0606030504020204" pitchFamily="34" charset="0"/>
-                <a:cs typeface="Open Sans" panose="020B0606030504020204" pitchFamily="34" charset="0"/>
-              </a:rPr>
-              <a:t> cu maxim 6,6 kW, </a:t>
-            </a:r>
-            <a:r>
-              <a:rPr lang="en-US" sz="2000" dirty="0" err="1">
-                <a:latin typeface="Open Sans" panose="020B0606030504020204" pitchFamily="34" charset="0"/>
-                <a:ea typeface="Open Sans" panose="020B0606030504020204" pitchFamily="34" charset="0"/>
-                <a:cs typeface="Open Sans" panose="020B0606030504020204" pitchFamily="34" charset="0"/>
-              </a:rPr>
-              <a:t>indiferent</a:t>
-            </a:r>
-            <a:r>
-              <a:rPr lang="en-US" sz="2000" dirty="0">
-                <a:latin typeface="Open Sans" panose="020B0606030504020204" pitchFamily="34" charset="0"/>
-                <a:ea typeface="Open Sans" panose="020B0606030504020204" pitchFamily="34" charset="0"/>
-                <a:cs typeface="Open Sans" panose="020B0606030504020204" pitchFamily="34" charset="0"/>
-              </a:rPr>
               <a:t> </a:t>
             </a:r>
             <a:r>
-              <a:rPr lang="en-US" sz="2000" dirty="0" err="1">
-                <a:latin typeface="Open Sans" panose="020B0606030504020204" pitchFamily="34" charset="0"/>
-                <a:ea typeface="Open Sans" panose="020B0606030504020204" pitchFamily="34" charset="0"/>
-                <a:cs typeface="Open Sans" panose="020B0606030504020204" pitchFamily="34" charset="0"/>
-              </a:rPr>
-              <a:t>dac</a:t>
+              <a:rPr lang="fr-FR" sz="2000" dirty="0" err="1">
+                <a:latin typeface="Open Sans" panose="020B0606030504020204" pitchFamily="34" charset="0"/>
+                <a:ea typeface="Open Sans" panose="020B0606030504020204" pitchFamily="34" charset="0"/>
+                <a:cs typeface="Open Sans" panose="020B0606030504020204" pitchFamily="34" charset="0"/>
+              </a:rPr>
+              <a:t>conectat</a:t>
+            </a:r>
+            <a:r>
+              <a:rPr lang="fr-FR" sz="2000" dirty="0">
+                <a:latin typeface="Open Sans" panose="020B0606030504020204" pitchFamily="34" charset="0"/>
+                <a:ea typeface="Open Sans" panose="020B0606030504020204" pitchFamily="34" charset="0"/>
+                <a:cs typeface="Open Sans" panose="020B0606030504020204" pitchFamily="34" charset="0"/>
+              </a:rPr>
+              <a:t> la o </a:t>
+            </a:r>
+            <a:r>
+              <a:rPr lang="fr-FR" sz="2000" dirty="0" err="1">
+                <a:latin typeface="Open Sans" panose="020B0606030504020204" pitchFamily="34" charset="0"/>
+                <a:ea typeface="Open Sans" panose="020B0606030504020204" pitchFamily="34" charset="0"/>
+                <a:cs typeface="Open Sans" panose="020B0606030504020204" pitchFamily="34" charset="0"/>
+              </a:rPr>
+              <a:t>sta</a:t>
             </a:r>
             <a:r>
               <a:rPr lang="ro-RO" sz="2000" dirty="0">
@@ -6459,10 +6555,18 @@
                 <a:ea typeface="Open Sans" panose="020B0606030504020204" pitchFamily="34" charset="0"/>
                 <a:cs typeface="Open Sans" panose="020B0606030504020204" pitchFamily="34" charset="0"/>
               </a:rPr>
-              <a:t>ă</a:t>
-            </a:r>
-            <a:r>
-              <a:rPr lang="en-US" sz="2000" dirty="0">
+              <a:t>ț</a:t>
+            </a:r>
+            <a:r>
+              <a:rPr lang="fr-FR" sz="2000" dirty="0" err="1">
+                <a:latin typeface="Open Sans" panose="020B0606030504020204" pitchFamily="34" charset="0"/>
+                <a:ea typeface="Open Sans" panose="020B0606030504020204" pitchFamily="34" charset="0"/>
+                <a:cs typeface="Open Sans" panose="020B0606030504020204" pitchFamily="34" charset="0"/>
+              </a:rPr>
+              <a:t>ie</a:t>
+            </a:r>
+            <a:r>
+              <a:rPr lang="fr-FR" sz="2000" dirty="0">
                 <a:latin typeface="Open Sans" panose="020B0606030504020204" pitchFamily="34" charset="0"/>
                 <a:ea typeface="Open Sans" panose="020B0606030504020204" pitchFamily="34" charset="0"/>
                 <a:cs typeface="Open Sans" panose="020B0606030504020204" pitchFamily="34" charset="0"/>
@@ -6470,84 +6574,28 @@
               <a:t> </a:t>
             </a:r>
             <a:r>
-              <a:rPr lang="en-US" sz="2000" dirty="0" err="1">
-                <a:latin typeface="Open Sans" panose="020B0606030504020204" pitchFamily="34" charset="0"/>
-                <a:ea typeface="Open Sans" panose="020B0606030504020204" pitchFamily="34" charset="0"/>
-                <a:cs typeface="Open Sans" panose="020B0606030504020204" pitchFamily="34" charset="0"/>
-              </a:rPr>
-              <a:t>acesta</a:t>
-            </a:r>
-            <a:r>
-              <a:rPr lang="en-US" sz="2000" dirty="0">
+              <a:rPr lang="fr-FR" sz="2000">
+                <a:latin typeface="Open Sans" panose="020B0606030504020204" pitchFamily="34" charset="0"/>
+                <a:ea typeface="Open Sans" panose="020B0606030504020204" pitchFamily="34" charset="0"/>
+                <a:cs typeface="Open Sans" panose="020B0606030504020204" pitchFamily="34" charset="0"/>
+              </a:rPr>
+              <a:t>de </a:t>
+            </a:r>
+            <a:r>
+              <a:rPr lang="en-US" sz="2000" smtClean="0">
+                <a:latin typeface="Open Sans" panose="020B0606030504020204" pitchFamily="34" charset="0"/>
+                <a:ea typeface="Open Sans" panose="020B0606030504020204" pitchFamily="34" charset="0"/>
+                <a:cs typeface="Open Sans" panose="020B0606030504020204" pitchFamily="34" charset="0"/>
+              </a:rPr>
+              <a:t>placeholder_putere2</a:t>
+            </a:r>
+            <a:r>
+              <a:rPr lang="fr-FR" sz="2000" smtClean="0">
                 <a:latin typeface="Open Sans" panose="020B0606030504020204" pitchFamily="34" charset="0"/>
                 <a:ea typeface="Open Sans" panose="020B0606030504020204" pitchFamily="34" charset="0"/>
                 <a:cs typeface="Open Sans" panose="020B0606030504020204" pitchFamily="34" charset="0"/>
               </a:rPr>
               <a:t> </a:t>
-            </a:r>
-            <a:r>
-              <a:rPr lang="en-US" sz="2000" dirty="0" err="1">
-                <a:latin typeface="Open Sans" panose="020B0606030504020204" pitchFamily="34" charset="0"/>
-                <a:ea typeface="Open Sans" panose="020B0606030504020204" pitchFamily="34" charset="0"/>
-                <a:cs typeface="Open Sans" panose="020B0606030504020204" pitchFamily="34" charset="0"/>
-              </a:rPr>
-              <a:t>este</a:t>
-            </a:r>
-            <a:r>
-              <a:rPr lang="ro-RO" sz="2000" dirty="0">
-                <a:latin typeface="Open Sans" panose="020B0606030504020204" pitchFamily="34" charset="0"/>
-                <a:ea typeface="Open Sans" panose="020B0606030504020204" pitchFamily="34" charset="0"/>
-                <a:cs typeface="Open Sans" panose="020B0606030504020204" pitchFamily="34" charset="0"/>
-              </a:rPr>
-              <a:t> </a:t>
-            </a:r>
-            <a:r>
-              <a:rPr lang="fr-FR" sz="2000" dirty="0" err="1">
-                <a:latin typeface="Open Sans" panose="020B0606030504020204" pitchFamily="34" charset="0"/>
-                <a:ea typeface="Open Sans" panose="020B0606030504020204" pitchFamily="34" charset="0"/>
-                <a:cs typeface="Open Sans" panose="020B0606030504020204" pitchFamily="34" charset="0"/>
-              </a:rPr>
-              <a:t>conectat</a:t>
-            </a:r>
-            <a:r>
-              <a:rPr lang="fr-FR" sz="2000" dirty="0">
-                <a:latin typeface="Open Sans" panose="020B0606030504020204" pitchFamily="34" charset="0"/>
-                <a:ea typeface="Open Sans" panose="020B0606030504020204" pitchFamily="34" charset="0"/>
-                <a:cs typeface="Open Sans" panose="020B0606030504020204" pitchFamily="34" charset="0"/>
-              </a:rPr>
-              <a:t> la o </a:t>
-            </a:r>
-            <a:r>
-              <a:rPr lang="fr-FR" sz="2000" dirty="0" err="1">
-                <a:latin typeface="Open Sans" panose="020B0606030504020204" pitchFamily="34" charset="0"/>
-                <a:ea typeface="Open Sans" panose="020B0606030504020204" pitchFamily="34" charset="0"/>
-                <a:cs typeface="Open Sans" panose="020B0606030504020204" pitchFamily="34" charset="0"/>
-              </a:rPr>
-              <a:t>sta</a:t>
-            </a:r>
-            <a:r>
-              <a:rPr lang="ro-RO" sz="2000" dirty="0">
-                <a:latin typeface="Open Sans" panose="020B0606030504020204" pitchFamily="34" charset="0"/>
-                <a:ea typeface="Open Sans" panose="020B0606030504020204" pitchFamily="34" charset="0"/>
-                <a:cs typeface="Open Sans" panose="020B0606030504020204" pitchFamily="34" charset="0"/>
-              </a:rPr>
-              <a:t>ț</a:t>
-            </a:r>
-            <a:r>
-              <a:rPr lang="fr-FR" sz="2000" dirty="0" err="1">
-                <a:latin typeface="Open Sans" panose="020B0606030504020204" pitchFamily="34" charset="0"/>
-                <a:ea typeface="Open Sans" panose="020B0606030504020204" pitchFamily="34" charset="0"/>
-                <a:cs typeface="Open Sans" panose="020B0606030504020204" pitchFamily="34" charset="0"/>
-              </a:rPr>
-              <a:t>ie</a:t>
-            </a:r>
-            <a:r>
-              <a:rPr lang="fr-FR" sz="2000" dirty="0">
-                <a:latin typeface="Open Sans" panose="020B0606030504020204" pitchFamily="34" charset="0"/>
-                <a:ea typeface="Open Sans" panose="020B0606030504020204" pitchFamily="34" charset="0"/>
-                <a:cs typeface="Open Sans" panose="020B0606030504020204" pitchFamily="34" charset="0"/>
-              </a:rPr>
-              <a:t> de 7,4 </a:t>
             </a:r>
             <a:r>
               <a:rPr lang="fr-FR" sz="2000" dirty="0" err="1">
@@ -6576,7 +6624,7 @@
               <a:buNone/>
             </a:pPr>
             <a:r>
-              <a:rPr lang="en-US" sz="2000" dirty="0" err="1">
+              <a:rPr lang="en-US" sz="2000" smtClean="0">
                 <a:latin typeface="Open Sans" panose="020B0606030504020204" pitchFamily="34" charset="0"/>
                 <a:ea typeface="Open Sans" panose="020B0606030504020204" pitchFamily="34" charset="0"/>
                 <a:cs typeface="Open Sans" panose="020B0606030504020204" pitchFamily="34" charset="0"/>
@@ -6584,22 +6632,13 @@
               <a:t>Sursa:</a:t>
             </a:r>
             <a:r>
-              <a:rPr lang="en-US" sz="2000" dirty="0" err="1">
+              <a:rPr lang="en-US" sz="2000" smtClean="0">
                 <a:latin typeface="Open Sans" panose="020B0606030504020204" pitchFamily="34" charset="0"/>
                 <a:ea typeface="Open Sans" panose="020B0606030504020204" pitchFamily="34" charset="0"/>
                 <a:cs typeface="Open Sans" panose="020B0606030504020204" pitchFamily="34" charset="0"/>
                 <a:hlinkClick r:id="rId2"/>
               </a:rPr>
-              <a:t>https</a:t>
-            </a:r>
-            <a:r>
-              <a:rPr lang="en-US" sz="2000" dirty="0">
-                <a:latin typeface="Open Sans" panose="020B0606030504020204" pitchFamily="34" charset="0"/>
-                <a:ea typeface="Open Sans" panose="020B0606030504020204" pitchFamily="34" charset="0"/>
-                <a:cs typeface="Open Sans" panose="020B0606030504020204" pitchFamily="34" charset="0"/>
-                <a:hlinkClick r:id="rId2"/>
-              </a:rPr>
-              <a:t>://ev-database.uk/</a:t>
+              <a:t>placeholder_sursa</a:t>
             </a:r>
             <a:r>
               <a:rPr lang="ro-RO" sz="2000" dirty="0">
@@ -6887,7 +6926,7 @@
           <p:cNvPr id="9" name="Picture 8">
             <a:extLst>
               <a:ext uri="{FF2B5EF4-FFF2-40B4-BE49-F238E27FC236}">
-                <a16:creationId xmlns:a16="http://schemas.microsoft.com/office/drawing/2014/main" xmlns="" id="{C2344C94-9753-46AB-B734-1376828DC139}"/>
+                <a16:creationId xmlns="" xmlns:a16="http://schemas.microsoft.com/office/drawing/2014/main" id="{C2344C94-9753-46AB-B734-1376828DC139}"/>
               </a:ext>
             </a:extLst>
           </p:cNvPr>
@@ -6917,7 +6956,7 @@
           <p:cNvPr id="10" name="Content Placeholder 4">
             <a:extLst>
               <a:ext uri="{FF2B5EF4-FFF2-40B4-BE49-F238E27FC236}">
-                <a16:creationId xmlns:a16="http://schemas.microsoft.com/office/drawing/2014/main" xmlns="" id="{4DA4C0B4-7BAE-44AD-977E-AF1E071D69CA}"/>
+                <a16:creationId xmlns="" xmlns:a16="http://schemas.microsoft.com/office/drawing/2014/main" id="{4DA4C0B4-7BAE-44AD-977E-AF1E071D69CA}"/>
               </a:ext>
             </a:extLst>
           </p:cNvPr>
@@ -6953,7 +6992,7 @@
           <p:cNvPr id="7" name="Title 1">
             <a:extLst>
               <a:ext uri="{FF2B5EF4-FFF2-40B4-BE49-F238E27FC236}">
-                <a16:creationId xmlns:a16="http://schemas.microsoft.com/office/drawing/2014/main" xmlns="" id="{FAC44FA6-4644-4838-AFDC-AEA04AD60FDA}"/>
+                <a16:creationId xmlns="" xmlns:a16="http://schemas.microsoft.com/office/drawing/2014/main" id="{FAC44FA6-4644-4838-AFDC-AEA04AD60FDA}"/>
               </a:ext>
             </a:extLst>
           </p:cNvPr>
@@ -7043,7 +7082,7 @@
           <p:cNvPr id="3" name="Content Placeholder 2">
             <a:extLst>
               <a:ext uri="{FF2B5EF4-FFF2-40B4-BE49-F238E27FC236}">
-                <a16:creationId xmlns:a16="http://schemas.microsoft.com/office/drawing/2014/main" xmlns="" id="{9E5F48F4-FADF-4C52-A783-02A165FCDF6E}"/>
+                <a16:creationId xmlns="" xmlns:a16="http://schemas.microsoft.com/office/drawing/2014/main" id="{9E5F48F4-FADF-4C52-A783-02A165FCDF6E}"/>
               </a:ext>
             </a:extLst>
           </p:cNvPr>
@@ -8376,7 +8415,7 @@
           <p:cNvPr id="4" name="Content Placeholder 4">
             <a:extLst>
               <a:ext uri="{FF2B5EF4-FFF2-40B4-BE49-F238E27FC236}">
-                <a16:creationId xmlns:a16="http://schemas.microsoft.com/office/drawing/2014/main" xmlns="" id="{0B504524-AC53-4315-AEFD-20465EE2E654}"/>
+                <a16:creationId xmlns="" xmlns:a16="http://schemas.microsoft.com/office/drawing/2014/main" id="{0B504524-AC53-4315-AEFD-20465EE2E654}"/>
               </a:ext>
             </a:extLst>
           </p:cNvPr>
@@ -8412,7 +8451,7 @@
           <p:cNvPr id="5" name="Title 1">
             <a:extLst>
               <a:ext uri="{FF2B5EF4-FFF2-40B4-BE49-F238E27FC236}">
-                <a16:creationId xmlns:a16="http://schemas.microsoft.com/office/drawing/2014/main" xmlns="" id="{DF51923C-87C9-4405-93E3-9B49C0D845D8}"/>
+                <a16:creationId xmlns="" xmlns:a16="http://schemas.microsoft.com/office/drawing/2014/main" id="{DF51923C-87C9-4405-93E3-9B49C0D845D8}"/>
               </a:ext>
             </a:extLst>
           </p:cNvPr>
@@ -8506,7 +8545,7 @@
           <p:cNvPr id="2" name="Title 1">
             <a:extLst>
               <a:ext uri="{FF2B5EF4-FFF2-40B4-BE49-F238E27FC236}">
-                <a16:creationId xmlns:a16="http://schemas.microsoft.com/office/drawing/2014/main" xmlns="" id="{A87C5838-A465-42BC-B4EF-0A1798E7150B}"/>
+                <a16:creationId xmlns="" xmlns:a16="http://schemas.microsoft.com/office/drawing/2014/main" id="{A87C5838-A465-42BC-B4EF-0A1798E7150B}"/>
               </a:ext>
             </a:extLst>
           </p:cNvPr>
@@ -8599,7 +8638,7 @@
           <p:cNvPr id="12" name="Content Placeholder 11">
             <a:extLst>
               <a:ext uri="{FF2B5EF4-FFF2-40B4-BE49-F238E27FC236}">
-                <a16:creationId xmlns:a16="http://schemas.microsoft.com/office/drawing/2014/main" xmlns="" id="{9B351FB4-2B0C-473D-B7DD-DFC0A8A39569}"/>
+                <a16:creationId xmlns="" xmlns:a16="http://schemas.microsoft.com/office/drawing/2014/main" id="{9B351FB4-2B0C-473D-B7DD-DFC0A8A39569}"/>
               </a:ext>
             </a:extLst>
           </p:cNvPr>
@@ -8629,35 +8668,35 @@
                 <a:gridCol w="1389920">
                   <a:extLst>
                     <a:ext uri="{9D8B030D-6E8A-4147-A177-3AD203B41FA5}">
-                      <a16:colId xmlns:a16="http://schemas.microsoft.com/office/drawing/2014/main" xmlns="" val="178067181"/>
+                      <a16:colId xmlns="" xmlns:a16="http://schemas.microsoft.com/office/drawing/2014/main" val="178067181"/>
                     </a:ext>
                   </a:extLst>
                 </a:gridCol>
                 <a:gridCol w="1389920">
                   <a:extLst>
                     <a:ext uri="{9D8B030D-6E8A-4147-A177-3AD203B41FA5}">
-                      <a16:colId xmlns:a16="http://schemas.microsoft.com/office/drawing/2014/main" xmlns="" val="4194835402"/>
+                      <a16:colId xmlns="" xmlns:a16="http://schemas.microsoft.com/office/drawing/2014/main" val="4194835402"/>
                     </a:ext>
                   </a:extLst>
                 </a:gridCol>
                 <a:gridCol w="1389920">
                   <a:extLst>
                     <a:ext uri="{9D8B030D-6E8A-4147-A177-3AD203B41FA5}">
-                      <a16:colId xmlns:a16="http://schemas.microsoft.com/office/drawing/2014/main" xmlns="" val="670133668"/>
+                      <a16:colId xmlns="" xmlns:a16="http://schemas.microsoft.com/office/drawing/2014/main" val="670133668"/>
                     </a:ext>
                   </a:extLst>
                 </a:gridCol>
                 <a:gridCol w="1389920">
                   <a:extLst>
                     <a:ext uri="{9D8B030D-6E8A-4147-A177-3AD203B41FA5}">
-                      <a16:colId xmlns:a16="http://schemas.microsoft.com/office/drawing/2014/main" xmlns="" val="3491137731"/>
+                      <a16:colId xmlns="" xmlns:a16="http://schemas.microsoft.com/office/drawing/2014/main" val="3491137731"/>
                     </a:ext>
                   </a:extLst>
                 </a:gridCol>
                 <a:gridCol w="1389920">
                   <a:extLst>
                     <a:ext uri="{9D8B030D-6E8A-4147-A177-3AD203B41FA5}">
-                      <a16:colId xmlns:a16="http://schemas.microsoft.com/office/drawing/2014/main" xmlns="" val="1657598158"/>
+                      <a16:colId xmlns="" xmlns:a16="http://schemas.microsoft.com/office/drawing/2014/main" val="1657598158"/>
                     </a:ext>
                   </a:extLst>
                 </a:gridCol>
@@ -8951,7 +8990,7 @@
                 </a:tc>
                 <a:extLst>
                   <a:ext uri="{0D108BD9-81ED-4DB2-BD59-A6C34878D82A}">
-                    <a16:rowId xmlns:a16="http://schemas.microsoft.com/office/drawing/2014/main" xmlns="" val="2973612357"/>
+                    <a16:rowId xmlns="" xmlns:a16="http://schemas.microsoft.com/office/drawing/2014/main" val="2973612357"/>
                   </a:ext>
                 </a:extLst>
               </a:tr>
@@ -9307,7 +9346,7 @@
                 </a:tc>
                 <a:extLst>
                   <a:ext uri="{0D108BD9-81ED-4DB2-BD59-A6C34878D82A}">
-                    <a16:rowId xmlns:a16="http://schemas.microsoft.com/office/drawing/2014/main" xmlns="" val="1717171452"/>
+                    <a16:rowId xmlns="" xmlns:a16="http://schemas.microsoft.com/office/drawing/2014/main" val="1717171452"/>
                   </a:ext>
                 </a:extLst>
               </a:tr>
@@ -9707,7 +9746,7 @@
                 </a:tc>
                 <a:extLst>
                   <a:ext uri="{0D108BD9-81ED-4DB2-BD59-A6C34878D82A}">
-                    <a16:rowId xmlns:a16="http://schemas.microsoft.com/office/drawing/2014/main" xmlns="" val="4092409273"/>
+                    <a16:rowId xmlns="" xmlns:a16="http://schemas.microsoft.com/office/drawing/2014/main" val="4092409273"/>
                   </a:ext>
                 </a:extLst>
               </a:tr>
@@ -10102,7 +10141,7 @@
                 </a:tc>
                 <a:extLst>
                   <a:ext uri="{0D108BD9-81ED-4DB2-BD59-A6C34878D82A}">
-                    <a16:rowId xmlns:a16="http://schemas.microsoft.com/office/drawing/2014/main" xmlns="" val="2783044044"/>
+                    <a16:rowId xmlns="" xmlns:a16="http://schemas.microsoft.com/office/drawing/2014/main" val="2783044044"/>
                   </a:ext>
                 </a:extLst>
               </a:tr>
@@ -10460,7 +10499,7 @@
                 </a:tc>
                 <a:extLst>
                   <a:ext uri="{0D108BD9-81ED-4DB2-BD59-A6C34878D82A}">
-                    <a16:rowId xmlns:a16="http://schemas.microsoft.com/office/drawing/2014/main" xmlns="" val="2742141302"/>
+                    <a16:rowId xmlns="" xmlns:a16="http://schemas.microsoft.com/office/drawing/2014/main" val="2742141302"/>
                   </a:ext>
                 </a:extLst>
               </a:tr>
@@ -10473,7 +10512,7 @@
           <p:cNvPr id="6" name="Content Placeholder 4">
             <a:extLst>
               <a:ext uri="{FF2B5EF4-FFF2-40B4-BE49-F238E27FC236}">
-                <a16:creationId xmlns:a16="http://schemas.microsoft.com/office/drawing/2014/main" xmlns="" id="{0F7DD9D8-2055-4E6B-8EC8-5E6EF0785998}"/>
+                <a16:creationId xmlns="" xmlns:a16="http://schemas.microsoft.com/office/drawing/2014/main" id="{0F7DD9D8-2055-4E6B-8EC8-5E6EF0785998}"/>
               </a:ext>
             </a:extLst>
           </p:cNvPr>
@@ -10509,7 +10548,7 @@
           <p:cNvPr id="13" name="TextBox 12">
             <a:extLst>
               <a:ext uri="{FF2B5EF4-FFF2-40B4-BE49-F238E27FC236}">
-                <a16:creationId xmlns:a16="http://schemas.microsoft.com/office/drawing/2014/main" xmlns="" id="{A79F5768-79AB-4262-BED4-291B25A4C2CE}"/>
+                <a16:creationId xmlns="" xmlns:a16="http://schemas.microsoft.com/office/drawing/2014/main" id="{A79F5768-79AB-4262-BED4-291B25A4C2CE}"/>
               </a:ext>
             </a:extLst>
           </p:cNvPr>
@@ -10812,7 +10851,7 @@
           <p:cNvPr id="2" name="Title 1">
             <a:extLst>
               <a:ext uri="{FF2B5EF4-FFF2-40B4-BE49-F238E27FC236}">
-                <a16:creationId xmlns:a16="http://schemas.microsoft.com/office/drawing/2014/main" xmlns="" id="{A87C5838-A465-42BC-B4EF-0A1798E7150B}"/>
+                <a16:creationId xmlns="" xmlns:a16="http://schemas.microsoft.com/office/drawing/2014/main" id="{A87C5838-A465-42BC-B4EF-0A1798E7150B}"/>
               </a:ext>
             </a:extLst>
           </p:cNvPr>
@@ -10929,7 +10968,7 @@
           <p:cNvPr id="12" name="Content Placeholder 11">
             <a:extLst>
               <a:ext uri="{FF2B5EF4-FFF2-40B4-BE49-F238E27FC236}">
-                <a16:creationId xmlns:a16="http://schemas.microsoft.com/office/drawing/2014/main" xmlns="" id="{9B351FB4-2B0C-473D-B7DD-DFC0A8A39569}"/>
+                <a16:creationId xmlns="" xmlns:a16="http://schemas.microsoft.com/office/drawing/2014/main" id="{9B351FB4-2B0C-473D-B7DD-DFC0A8A39569}"/>
               </a:ext>
             </a:extLst>
           </p:cNvPr>
@@ -10959,35 +10998,35 @@
                 <a:gridCol w="1389920">
                   <a:extLst>
                     <a:ext uri="{9D8B030D-6E8A-4147-A177-3AD203B41FA5}">
-                      <a16:colId xmlns:a16="http://schemas.microsoft.com/office/drawing/2014/main" xmlns="" val="178067181"/>
+                      <a16:colId xmlns="" xmlns:a16="http://schemas.microsoft.com/office/drawing/2014/main" val="178067181"/>
                     </a:ext>
                   </a:extLst>
                 </a:gridCol>
                 <a:gridCol w="1389920">
                   <a:extLst>
                     <a:ext uri="{9D8B030D-6E8A-4147-A177-3AD203B41FA5}">
-                      <a16:colId xmlns:a16="http://schemas.microsoft.com/office/drawing/2014/main" xmlns="" val="4194835402"/>
+                      <a16:colId xmlns="" xmlns:a16="http://schemas.microsoft.com/office/drawing/2014/main" val="4194835402"/>
                     </a:ext>
                   </a:extLst>
                 </a:gridCol>
                 <a:gridCol w="1389920">
                   <a:extLst>
                     <a:ext uri="{9D8B030D-6E8A-4147-A177-3AD203B41FA5}">
-                      <a16:colId xmlns:a16="http://schemas.microsoft.com/office/drawing/2014/main" xmlns="" val="670133668"/>
+                      <a16:colId xmlns="" xmlns:a16="http://schemas.microsoft.com/office/drawing/2014/main" val="670133668"/>
                     </a:ext>
                   </a:extLst>
                 </a:gridCol>
                 <a:gridCol w="1389920">
                   <a:extLst>
                     <a:ext uri="{9D8B030D-6E8A-4147-A177-3AD203B41FA5}">
-                      <a16:colId xmlns:a16="http://schemas.microsoft.com/office/drawing/2014/main" xmlns="" val="3491137731"/>
+                      <a16:colId xmlns="" xmlns:a16="http://schemas.microsoft.com/office/drawing/2014/main" val="3491137731"/>
                     </a:ext>
                   </a:extLst>
                 </a:gridCol>
                 <a:gridCol w="1389920">
                   <a:extLst>
                     <a:ext uri="{9D8B030D-6E8A-4147-A177-3AD203B41FA5}">
-                      <a16:colId xmlns:a16="http://schemas.microsoft.com/office/drawing/2014/main" xmlns="" val="1657598158"/>
+                      <a16:colId xmlns="" xmlns:a16="http://schemas.microsoft.com/office/drawing/2014/main" val="1657598158"/>
                     </a:ext>
                   </a:extLst>
                 </a:gridCol>
@@ -11281,7 +11320,7 @@
                 </a:tc>
                 <a:extLst>
                   <a:ext uri="{0D108BD9-81ED-4DB2-BD59-A6C34878D82A}">
-                    <a16:rowId xmlns:a16="http://schemas.microsoft.com/office/drawing/2014/main" xmlns="" val="2973612357"/>
+                    <a16:rowId xmlns="" xmlns:a16="http://schemas.microsoft.com/office/drawing/2014/main" val="2973612357"/>
                   </a:ext>
                 </a:extLst>
               </a:tr>
@@ -11669,7 +11708,7 @@
                 </a:tc>
                 <a:extLst>
                   <a:ext uri="{0D108BD9-81ED-4DB2-BD59-A6C34878D82A}">
-                    <a16:rowId xmlns:a16="http://schemas.microsoft.com/office/drawing/2014/main" xmlns="" val="1717171452"/>
+                    <a16:rowId xmlns="" xmlns:a16="http://schemas.microsoft.com/office/drawing/2014/main" val="1717171452"/>
                   </a:ext>
                 </a:extLst>
               </a:tr>
@@ -12021,7 +12060,7 @@
                 </a:tc>
                 <a:extLst>
                   <a:ext uri="{0D108BD9-81ED-4DB2-BD59-A6C34878D82A}">
-                    <a16:rowId xmlns:a16="http://schemas.microsoft.com/office/drawing/2014/main" xmlns="" val="4092409273"/>
+                    <a16:rowId xmlns="" xmlns:a16="http://schemas.microsoft.com/office/drawing/2014/main" val="4092409273"/>
                   </a:ext>
                 </a:extLst>
               </a:tr>
@@ -12371,7 +12410,7 @@
                 </a:tc>
                 <a:extLst>
                   <a:ext uri="{0D108BD9-81ED-4DB2-BD59-A6C34878D82A}">
-                    <a16:rowId xmlns:a16="http://schemas.microsoft.com/office/drawing/2014/main" xmlns="" val="2783044044"/>
+                    <a16:rowId xmlns="" xmlns:a16="http://schemas.microsoft.com/office/drawing/2014/main" val="2783044044"/>
                   </a:ext>
                 </a:extLst>
               </a:tr>
@@ -12384,7 +12423,7 @@
           <p:cNvPr id="6" name="Content Placeholder 4">
             <a:extLst>
               <a:ext uri="{FF2B5EF4-FFF2-40B4-BE49-F238E27FC236}">
-                <a16:creationId xmlns:a16="http://schemas.microsoft.com/office/drawing/2014/main" xmlns="" id="{0F7DD9D8-2055-4E6B-8EC8-5E6EF0785998}"/>
+                <a16:creationId xmlns="" xmlns:a16="http://schemas.microsoft.com/office/drawing/2014/main" id="{0F7DD9D8-2055-4E6B-8EC8-5E6EF0785998}"/>
               </a:ext>
             </a:extLst>
           </p:cNvPr>
@@ -12420,7 +12459,7 @@
           <p:cNvPr id="13" name="TextBox 12">
             <a:extLst>
               <a:ext uri="{FF2B5EF4-FFF2-40B4-BE49-F238E27FC236}">
-                <a16:creationId xmlns:a16="http://schemas.microsoft.com/office/drawing/2014/main" xmlns="" id="{A79F5768-79AB-4262-BED4-291B25A4C2CE}"/>
+                <a16:creationId xmlns="" xmlns:a16="http://schemas.microsoft.com/office/drawing/2014/main" id="{A79F5768-79AB-4262-BED4-291B25A4C2CE}"/>
               </a:ext>
             </a:extLst>
           </p:cNvPr>
@@ -12959,7 +12998,7 @@
           <p:cNvPr id="2" name="Title 1">
             <a:extLst>
               <a:ext uri="{FF2B5EF4-FFF2-40B4-BE49-F238E27FC236}">
-                <a16:creationId xmlns:a16="http://schemas.microsoft.com/office/drawing/2014/main" xmlns="" id="{A87C5838-A465-42BC-B4EF-0A1798E7150B}"/>
+                <a16:creationId xmlns="" xmlns:a16="http://schemas.microsoft.com/office/drawing/2014/main" id="{A87C5838-A465-42BC-B4EF-0A1798E7150B}"/>
               </a:ext>
             </a:extLst>
           </p:cNvPr>
@@ -13020,7 +13059,7 @@
           <p:cNvPr id="6" name="Content Placeholder 4">
             <a:extLst>
               <a:ext uri="{FF2B5EF4-FFF2-40B4-BE49-F238E27FC236}">
-                <a16:creationId xmlns:a16="http://schemas.microsoft.com/office/drawing/2014/main" xmlns="" id="{0F7DD9D8-2055-4E6B-8EC8-5E6EF0785998}"/>
+                <a16:creationId xmlns="" xmlns:a16="http://schemas.microsoft.com/office/drawing/2014/main" id="{0F7DD9D8-2055-4E6B-8EC8-5E6EF0785998}"/>
               </a:ext>
             </a:extLst>
           </p:cNvPr>
@@ -13056,7 +13095,7 @@
           <p:cNvPr id="8" name="Content Placeholder 11">
             <a:extLst>
               <a:ext uri="{FF2B5EF4-FFF2-40B4-BE49-F238E27FC236}">
-                <a16:creationId xmlns:a16="http://schemas.microsoft.com/office/drawing/2014/main" xmlns="" id="{81BFA9F9-30F4-45B5-BEBE-A8ACA2122B7B}"/>
+                <a16:creationId xmlns="" xmlns:a16="http://schemas.microsoft.com/office/drawing/2014/main" id="{81BFA9F9-30F4-45B5-BEBE-A8ACA2122B7B}"/>
               </a:ext>
             </a:extLst>
           </p:cNvPr>
@@ -13086,35 +13125,35 @@
                 <a:gridCol w="1400349">
                   <a:extLst>
                     <a:ext uri="{9D8B030D-6E8A-4147-A177-3AD203B41FA5}">
-                      <a16:colId xmlns:a16="http://schemas.microsoft.com/office/drawing/2014/main" xmlns="" val="178067181"/>
+                      <a16:colId xmlns="" xmlns:a16="http://schemas.microsoft.com/office/drawing/2014/main" val="178067181"/>
                     </a:ext>
                   </a:extLst>
                 </a:gridCol>
                 <a:gridCol w="2246156">
                   <a:extLst>
                     <a:ext uri="{9D8B030D-6E8A-4147-A177-3AD203B41FA5}">
-                      <a16:colId xmlns:a16="http://schemas.microsoft.com/office/drawing/2014/main" xmlns="" val="4194835402"/>
+                      <a16:colId xmlns="" xmlns:a16="http://schemas.microsoft.com/office/drawing/2014/main" val="4194835402"/>
                     </a:ext>
                   </a:extLst>
                 </a:gridCol>
                 <a:gridCol w="1542920">
                   <a:extLst>
                     <a:ext uri="{9D8B030D-6E8A-4147-A177-3AD203B41FA5}">
-                      <a16:colId xmlns:a16="http://schemas.microsoft.com/office/drawing/2014/main" xmlns="" val="670133668"/>
+                      <a16:colId xmlns="" xmlns:a16="http://schemas.microsoft.com/office/drawing/2014/main" val="670133668"/>
                     </a:ext>
                   </a:extLst>
                 </a:gridCol>
                 <a:gridCol w="1249030">
                   <a:extLst>
                     <a:ext uri="{9D8B030D-6E8A-4147-A177-3AD203B41FA5}">
-                      <a16:colId xmlns:a16="http://schemas.microsoft.com/office/drawing/2014/main" xmlns="" val="3491137731"/>
+                      <a16:colId xmlns="" xmlns:a16="http://schemas.microsoft.com/office/drawing/2014/main" val="3491137731"/>
                     </a:ext>
                   </a:extLst>
                 </a:gridCol>
                 <a:gridCol w="1219643">
                   <a:extLst>
                     <a:ext uri="{9D8B030D-6E8A-4147-A177-3AD203B41FA5}">
-                      <a16:colId xmlns:a16="http://schemas.microsoft.com/office/drawing/2014/main" xmlns="" val="1657598158"/>
+                      <a16:colId xmlns="" xmlns:a16="http://schemas.microsoft.com/office/drawing/2014/main" val="1657598158"/>
                     </a:ext>
                   </a:extLst>
                 </a:gridCol>
@@ -13419,7 +13458,7 @@
                 </a:tc>
                 <a:extLst>
                   <a:ext uri="{0D108BD9-81ED-4DB2-BD59-A6C34878D82A}">
-                    <a16:rowId xmlns:a16="http://schemas.microsoft.com/office/drawing/2014/main" xmlns="" val="2973612357"/>
+                    <a16:rowId xmlns="" xmlns:a16="http://schemas.microsoft.com/office/drawing/2014/main" val="2973612357"/>
                   </a:ext>
                 </a:extLst>
               </a:tr>
@@ -13795,7 +13834,7 @@
                 </a:tc>
                 <a:extLst>
                   <a:ext uri="{0D108BD9-81ED-4DB2-BD59-A6C34878D82A}">
-                    <a16:rowId xmlns:a16="http://schemas.microsoft.com/office/drawing/2014/main" xmlns="" val="1717171452"/>
+                    <a16:rowId xmlns="" xmlns:a16="http://schemas.microsoft.com/office/drawing/2014/main" val="1717171452"/>
                   </a:ext>
                 </a:extLst>
               </a:tr>
@@ -14167,7 +14206,7 @@
                 </a:tc>
                 <a:extLst>
                   <a:ext uri="{0D108BD9-81ED-4DB2-BD59-A6C34878D82A}">
-                    <a16:rowId xmlns:a16="http://schemas.microsoft.com/office/drawing/2014/main" xmlns="" val="4092409273"/>
+                    <a16:rowId xmlns="" xmlns:a16="http://schemas.microsoft.com/office/drawing/2014/main" val="4092409273"/>
                   </a:ext>
                 </a:extLst>
               </a:tr>
@@ -14533,7 +14572,7 @@
                 </a:tc>
                 <a:extLst>
                   <a:ext uri="{0D108BD9-81ED-4DB2-BD59-A6C34878D82A}">
-                    <a16:rowId xmlns:a16="http://schemas.microsoft.com/office/drawing/2014/main" xmlns="" val="2783044044"/>
+                    <a16:rowId xmlns="" xmlns:a16="http://schemas.microsoft.com/office/drawing/2014/main" val="2783044044"/>
                   </a:ext>
                 </a:extLst>
               </a:tr>
@@ -14943,7 +14982,7 @@
                 </a:tc>
                 <a:extLst>
                   <a:ext uri="{0D108BD9-81ED-4DB2-BD59-A6C34878D82A}">
-                    <a16:rowId xmlns:a16="http://schemas.microsoft.com/office/drawing/2014/main" xmlns="" val="881717331"/>
+                    <a16:rowId xmlns="" xmlns:a16="http://schemas.microsoft.com/office/drawing/2014/main" val="881717331"/>
                   </a:ext>
                 </a:extLst>
               </a:tr>
@@ -15309,7 +15348,7 @@
                 </a:tc>
                 <a:extLst>
                   <a:ext uri="{0D108BD9-81ED-4DB2-BD59-A6C34878D82A}">
-                    <a16:rowId xmlns:a16="http://schemas.microsoft.com/office/drawing/2014/main" xmlns="" val="3830834582"/>
+                    <a16:rowId xmlns="" xmlns:a16="http://schemas.microsoft.com/office/drawing/2014/main" val="3830834582"/>
                   </a:ext>
                 </a:extLst>
               </a:tr>
@@ -15630,7 +15669,7 @@
                 </a:tc>
                 <a:extLst>
                   <a:ext uri="{0D108BD9-81ED-4DB2-BD59-A6C34878D82A}">
-                    <a16:rowId xmlns:a16="http://schemas.microsoft.com/office/drawing/2014/main" xmlns="" val="1580117681"/>
+                    <a16:rowId xmlns="" xmlns:a16="http://schemas.microsoft.com/office/drawing/2014/main" val="1580117681"/>
                   </a:ext>
                 </a:extLst>
               </a:tr>
@@ -15643,7 +15682,7 @@
           <p:cNvPr id="5" name="TextBox 4">
             <a:extLst>
               <a:ext uri="{FF2B5EF4-FFF2-40B4-BE49-F238E27FC236}">
-                <a16:creationId xmlns:a16="http://schemas.microsoft.com/office/drawing/2014/main" xmlns="" id="{A70A6C46-80E0-495F-A48B-C5497EE1467B}"/>
+                <a16:creationId xmlns="" xmlns:a16="http://schemas.microsoft.com/office/drawing/2014/main" id="{A70A6C46-80E0-495F-A48B-C5497EE1467B}"/>
               </a:ext>
             </a:extLst>
           </p:cNvPr>
@@ -15744,7 +15783,7 @@
           <p:cNvPr id="3" name="TextBox 2">
             <a:extLst>
               <a:ext uri="{FF2B5EF4-FFF2-40B4-BE49-F238E27FC236}">
-                <a16:creationId xmlns:a16="http://schemas.microsoft.com/office/drawing/2014/main" xmlns="" id="{C166FD14-DDAC-40E7-8D25-1124C9239E33}"/>
+                <a16:creationId xmlns="" xmlns:a16="http://schemas.microsoft.com/office/drawing/2014/main" id="{C166FD14-DDAC-40E7-8D25-1124C9239E33}"/>
               </a:ext>
             </a:extLst>
           </p:cNvPr>
@@ -17996,7 +18035,7 @@
           <p:cNvPr id="4" name="Content Placeholder 4">
             <a:extLst>
               <a:ext uri="{FF2B5EF4-FFF2-40B4-BE49-F238E27FC236}">
-                <a16:creationId xmlns:a16="http://schemas.microsoft.com/office/drawing/2014/main" xmlns="" id="{AF9E6373-E49E-424B-ABD4-E682CF854674}"/>
+                <a16:creationId xmlns="" xmlns:a16="http://schemas.microsoft.com/office/drawing/2014/main" id="{AF9E6373-E49E-424B-ABD4-E682CF854674}"/>
               </a:ext>
             </a:extLst>
           </p:cNvPr>
@@ -18032,7 +18071,7 @@
           <p:cNvPr id="2" name="TextBox 1">
             <a:extLst>
               <a:ext uri="{FF2B5EF4-FFF2-40B4-BE49-F238E27FC236}">
-                <a16:creationId xmlns:a16="http://schemas.microsoft.com/office/drawing/2014/main" xmlns="" id="{837320B4-D9A6-47EF-9C3A-1F78058CA476}"/>
+                <a16:creationId xmlns="" xmlns:a16="http://schemas.microsoft.com/office/drawing/2014/main" id="{837320B4-D9A6-47EF-9C3A-1F78058CA476}"/>
               </a:ext>
             </a:extLst>
           </p:cNvPr>

</xml_diff>